<commit_message>
fix: Add .gitattributes to prevent binary file corruption
</commit_message>
<xml_diff>
--- a/powerpoint-automation/assets/template.pptx
+++ b/powerpoint-automation/assets/template.pptx
@@ -1,6 +1,6 @@
 
 <file path=ppt/presentation.xml><?xml version="1.0" encoding="utf-8"?>
-<p:presentation xmlns:a="http://schemas.openxmlformats.org/drawingml/2006/main" xmlns:r="http://schemas.openxmlformats.org/officeDocument/2006/relationships" xmlns:p="http://schemas.openxmlformats.org/presentationml/2006/main" removePersonalInfoOnSave="1" saveSubsetFonts="1">
+<p:presentation xmlns:a="http://schemas.openxmlformats.org/drawingml/2006/main" xmlns:r="http://schemas.openxmlformats.org/officeDocument/2006/relationships" xmlns:p="http://schemas.openxmlformats.org/presentationml/2006/main" saveSubsetFonts="1">
   <p:sldMasterIdLst>
     <p:sldMasterId id="2147483648" r:id="rId1"/>
   </p:sldMasterIdLst>
@@ -247,7 +247,7 @@
           <a:p>
             <a:fld id="{BDC9863B-91B4-47BC-8440-E4181E1A9D87}" type="datetimeFigureOut">
               <a:rPr kumimoji="1" lang="ja-JP" altLang="en-US" smtClean="0"/>
-              <a:t>2025/12/14</a:t>
+              <a:t>2026/2/2</a:t>
             </a:fld>
             <a:endParaRPr kumimoji="1" lang="ja-JP" altLang="en-US"/>
           </a:p>
@@ -424,7 +424,7 @@
           <a:p>
             <a:fld id="{F2D47CB2-9843-4E08-99A9-CD5798075F2A}" type="datetimeFigureOut">
               <a:rPr kumimoji="1" lang="ja-JP" altLang="en-US" smtClean="0"/>
-              <a:t>2025/12/14</a:t>
+              <a:t>2026/2/2</a:t>
             </a:fld>
             <a:endParaRPr kumimoji="1" lang="ja-JP" altLang="en-US"/>
           </a:p>
@@ -876,9 +876,9 @@
           <a:bodyPr/>
           <a:lstStyle/>
           <a:p>
-            <a:fld id="{19426BBC-4C99-4D42-A60E-078DBFAA76BC}" type="datetimeFigureOut">
+            <a:fld id="{0E93E16A-FB7A-4AF6-8B5F-6543D5DC1C62}" type="datetime1">
               <a:rPr kumimoji="1" lang="ja-JP" altLang="en-US" smtClean="0"/>
-              <a:t>2025/12/14</a:t>
+              <a:t>2026/2/2</a:t>
             </a:fld>
             <a:endParaRPr kumimoji="1" lang="ja-JP" altLang="en-US"/>
           </a:p>
@@ -1148,9 +1148,9 @@
           <a:bodyPr/>
           <a:lstStyle/>
           <a:p>
-            <a:fld id="{19426BBC-4C99-4D42-A60E-078DBFAA76BC}" type="datetimeFigureOut">
+            <a:fld id="{9C6A2484-01F1-4E7F-84E5-6649B77DA189}" type="datetime1">
               <a:rPr kumimoji="1" lang="ja-JP" altLang="en-US" smtClean="0"/>
-              <a:t>2025/12/14</a:t>
+              <a:t>2026/2/2</a:t>
             </a:fld>
             <a:endParaRPr kumimoji="1" lang="ja-JP" altLang="en-US"/>
           </a:p>
@@ -1605,10 +1605,9 @@
             </a:lvl1pPr>
           </a:lstStyle>
           <a:p>
-            <a:fld id="{19426BBC-4C99-4D42-A60E-078DBFAA76BC}" type="datetimeFigureOut">
+            <a:fld id="{F425569C-1A8D-452D-8BDE-6F44DDD55B64}" type="datetime1">
               <a:rPr lang="ja-JP" altLang="en-US" smtClean="0"/>
-              <a:pPr/>
-              <a:t>2025/12/14</a:t>
+              <a:t>2026/2/2</a:t>
             </a:fld>
             <a:endParaRPr lang="ja-JP" altLang="en-US"/>
           </a:p>
@@ -1900,9 +1899,9 @@
             </a:lvl1pPr>
           </a:lstStyle>
           <a:p>
-            <a:fld id="{19426BBC-4C99-4D42-A60E-078DBFAA76BC}" type="datetimeFigureOut">
+            <a:fld id="{5C961ED8-9ECD-4666-A85B-E124BEF812D7}" type="datetime1">
               <a:rPr kumimoji="1" lang="ja-JP" altLang="en-US" smtClean="0"/>
-              <a:t>2025/12/14</a:t>
+              <a:t>2026/2/2</a:t>
             </a:fld>
             <a:endParaRPr kumimoji="1" lang="ja-JP" altLang="en-US"/>
           </a:p>
@@ -2012,6 +2011,7 @@
     <p:sldLayoutId id="2147483679" r:id="rId3"/>
     <p:sldLayoutId id="2147483651" r:id="rId4"/>
   </p:sldLayoutIdLst>
+  <p:hf hdr="0" ftr="0" dt="0"/>
   <p:txStyles>
     <p:titleStyle>
       <a:lvl1pPr algn="l" defTabSz="914400" rtl="0" eaLnBrk="1" latinLnBrk="0" hangingPunct="1">
@@ -5701,6 +5701,35 @@
           </p:txBody>
         </p:sp>
       </p:grpSp>
+      <p:sp>
+        <p:nvSpPr>
+          <p:cNvPr id="6" name="スライド番号プレースホルダー 5">
+            <a:extLst>
+              <a:ext uri="{FF2B5EF4-FFF2-40B4-BE49-F238E27FC236}">
+                <a16:creationId xmlns:a16="http://schemas.microsoft.com/office/drawing/2014/main" id="{1104E2CE-3CEB-6938-0A61-051C92EC0559}"/>
+              </a:ext>
+            </a:extLst>
+          </p:cNvPr>
+          <p:cNvSpPr>
+            <a:spLocks noGrp="1"/>
+          </p:cNvSpPr>
+          <p:nvPr>
+            <p:ph type="sldNum" sz="quarter" idx="12"/>
+          </p:nvPr>
+        </p:nvSpPr>
+        <p:spPr/>
+        <p:txBody>
+          <a:bodyPr/>
+          <a:lstStyle/>
+          <a:p>
+            <a:fld id="{9A4C7EE5-525F-42BC-A0F7-BD37EC376DF4}" type="slidenum">
+              <a:rPr kumimoji="1" lang="ja-JP" altLang="en-US" smtClean="0"/>
+              <a:t>1</a:t>
+            </a:fld>
+            <a:endParaRPr kumimoji="1" lang="ja-JP" altLang="en-US"/>
+          </a:p>
+        </p:txBody>
+      </p:sp>
     </p:spTree>
     <p:extLst>
       <p:ext uri="{BB962C8B-B14F-4D97-AF65-F5344CB8AC3E}">
@@ -5761,6 +5790,35 @@
               <a:rPr kumimoji="1" lang="ja-JP" altLang="en-US" sz="4000" dirty="0"/>
               <a:t>イケてない スライド作成から終了</a:t>
             </a:r>
+          </a:p>
+        </p:txBody>
+      </p:sp>
+      <p:sp>
+        <p:nvSpPr>
+          <p:cNvPr id="4" name="スライド番号プレースホルダー 3">
+            <a:extLst>
+              <a:ext uri="{FF2B5EF4-FFF2-40B4-BE49-F238E27FC236}">
+                <a16:creationId xmlns:a16="http://schemas.microsoft.com/office/drawing/2014/main" id="{647C3C9C-215F-CE57-C443-34C4ED87C1F3}"/>
+              </a:ext>
+            </a:extLst>
+          </p:cNvPr>
+          <p:cNvSpPr>
+            <a:spLocks noGrp="1"/>
+          </p:cNvSpPr>
+          <p:nvPr>
+            <p:ph type="sldNum" sz="quarter" idx="12"/>
+          </p:nvPr>
+        </p:nvSpPr>
+        <p:spPr/>
+        <p:txBody>
+          <a:bodyPr/>
+          <a:lstStyle/>
+          <a:p>
+            <a:fld id="{9A4C7EE5-525F-42BC-A0F7-BD37EC376DF4}" type="slidenum">
+              <a:rPr kumimoji="1" lang="ja-JP" altLang="en-US" smtClean="0"/>
+              <a:t>2</a:t>
+            </a:fld>
+            <a:endParaRPr kumimoji="1" lang="ja-JP" altLang="en-US"/>
           </a:p>
         </p:txBody>
       </p:sp>
@@ -5868,6 +5926,35 @@
           </a:p>
         </p:txBody>
       </p:sp>
+      <p:sp>
+        <p:nvSpPr>
+          <p:cNvPr id="5" name="スライド番号プレースホルダー 4">
+            <a:extLst>
+              <a:ext uri="{FF2B5EF4-FFF2-40B4-BE49-F238E27FC236}">
+                <a16:creationId xmlns:a16="http://schemas.microsoft.com/office/drawing/2014/main" id="{90DAE2E8-73AE-E1BB-351A-3AE67E8F5EFC}"/>
+              </a:ext>
+            </a:extLst>
+          </p:cNvPr>
+          <p:cNvSpPr>
+            <a:spLocks noGrp="1"/>
+          </p:cNvSpPr>
+          <p:nvPr>
+            <p:ph type="sldNum" sz="quarter" idx="12"/>
+          </p:nvPr>
+        </p:nvSpPr>
+        <p:spPr/>
+        <p:txBody>
+          <a:bodyPr/>
+          <a:lstStyle/>
+          <a:p>
+            <a:fld id="{9A4C7EE5-525F-42BC-A0F7-BD37EC376DF4}" type="slidenum">
+              <a:rPr kumimoji="1" lang="ja-JP" altLang="en-US" smtClean="0"/>
+              <a:t>3</a:t>
+            </a:fld>
+            <a:endParaRPr kumimoji="1" lang="ja-JP" altLang="en-US"/>
+          </a:p>
+        </p:txBody>
+      </p:sp>
     </p:spTree>
     <p:extLst>
       <p:ext uri="{BB962C8B-B14F-4D97-AF65-F5344CB8AC3E}">
@@ -5967,6 +6054,35 @@
               <a:t> をつかう</a:t>
             </a:r>
             <a:endParaRPr kumimoji="1" lang="ja-JP" altLang="en-US" dirty="0"/>
+          </a:p>
+        </p:txBody>
+      </p:sp>
+      <p:sp>
+        <p:nvSpPr>
+          <p:cNvPr id="3" name="スライド番号プレースホルダー 2">
+            <a:extLst>
+              <a:ext uri="{FF2B5EF4-FFF2-40B4-BE49-F238E27FC236}">
+                <a16:creationId xmlns:a16="http://schemas.microsoft.com/office/drawing/2014/main" id="{C7705B8C-B001-C886-DD01-01852694C7A3}"/>
+              </a:ext>
+            </a:extLst>
+          </p:cNvPr>
+          <p:cNvSpPr>
+            <a:spLocks noGrp="1"/>
+          </p:cNvSpPr>
+          <p:nvPr>
+            <p:ph type="sldNum" sz="quarter" idx="12"/>
+          </p:nvPr>
+        </p:nvSpPr>
+        <p:spPr/>
+        <p:txBody>
+          <a:bodyPr/>
+          <a:lstStyle/>
+          <a:p>
+            <a:fld id="{DD4A77EA-15BE-474E-BDEE-93080A2256C0}" type="slidenum">
+              <a:rPr lang="en-US" smtClean="0"/>
+              <a:t>4</a:t>
+            </a:fld>
+            <a:endParaRPr lang="en-US"/>
           </a:p>
         </p:txBody>
       </p:sp>
@@ -6116,6 +6232,35 @@
                 <a:schemeClr val="tx2"/>
               </a:solidFill>
             </a:endParaRPr>
+          </a:p>
+        </p:txBody>
+      </p:sp>
+      <p:sp>
+        <p:nvSpPr>
+          <p:cNvPr id="5" name="スライド番号プレースホルダー 4">
+            <a:extLst>
+              <a:ext uri="{FF2B5EF4-FFF2-40B4-BE49-F238E27FC236}">
+                <a16:creationId xmlns:a16="http://schemas.microsoft.com/office/drawing/2014/main" id="{E39E4C5D-4678-E46B-9816-649C4AC3FFBB}"/>
+              </a:ext>
+            </a:extLst>
+          </p:cNvPr>
+          <p:cNvSpPr>
+            <a:spLocks noGrp="1"/>
+          </p:cNvSpPr>
+          <p:nvPr>
+            <p:ph type="sldNum" sz="quarter" idx="12"/>
+          </p:nvPr>
+        </p:nvSpPr>
+        <p:spPr/>
+        <p:txBody>
+          <a:bodyPr/>
+          <a:lstStyle/>
+          <a:p>
+            <a:fld id="{9A4C7EE5-525F-42BC-A0F7-BD37EC376DF4}" type="slidenum">
+              <a:rPr kumimoji="1" lang="ja-JP" altLang="en-US" smtClean="0"/>
+              <a:t>5</a:t>
+            </a:fld>
+            <a:endParaRPr kumimoji="1" lang="ja-JP" altLang="en-US"/>
           </a:p>
         </p:txBody>
       </p:sp>

</xml_diff>